<commit_message>
updated image for consistency
</commit_message>
<xml_diff>
--- a/Docs/ci-server.pptx
+++ b/Docs/ci-server.pptx
@@ -6,6 +6,7 @@
   </p:sldMasterIdLst>
   <p:sldIdLst>
     <p:sldId id="256" r:id="rId2"/>
+    <p:sldId id="257" r:id="rId3"/>
   </p:sldIdLst>
   <p:sldSz cx="12192000" cy="6858000"/>
   <p:notesSz cx="6858000" cy="9144000"/>
@@ -4003,9 +4004,7 @@
                 <a:prstGeom prst="rect">
                   <a:avLst/>
                 </a:prstGeom>
-                <a:solidFill>
-                  <a:schemeClr val="bg1"/>
-                </a:solidFill>
+                <a:noFill/>
                 <a:ln>
                   <a:solidFill>
                     <a:srgbClr val="0079D6"/>
@@ -4391,6 +4390,1315 @@
 </p:sld>
 </file>
 
+<file path=ppt/slides/slide2.xml><?xml version="1.0" encoding="utf-8"?>
+<p:sld xmlns:a="http://schemas.openxmlformats.org/drawingml/2006/main" xmlns:r="http://schemas.openxmlformats.org/officeDocument/2006/relationships" xmlns:p="http://schemas.openxmlformats.org/presentationml/2006/main">
+  <p:cSld>
+    <p:spTree>
+      <p:nvGrpSpPr>
+        <p:cNvPr id="1" name=""/>
+        <p:cNvGrpSpPr/>
+        <p:nvPr/>
+      </p:nvGrpSpPr>
+      <p:grpSpPr>
+        <a:xfrm>
+          <a:off x="0" y="0"/>
+          <a:ext cx="0" cy="0"/>
+          <a:chOff x="0" y="0"/>
+          <a:chExt cx="0" cy="0"/>
+        </a:xfrm>
+      </p:grpSpPr>
+      <p:grpSp>
+        <p:nvGrpSpPr>
+          <p:cNvPr id="14" name="Group 13"/>
+          <p:cNvGrpSpPr/>
+          <p:nvPr/>
+        </p:nvGrpSpPr>
+        <p:grpSpPr>
+          <a:xfrm>
+            <a:off x="3161969" y="1027464"/>
+            <a:ext cx="5868063" cy="4803072"/>
+            <a:chOff x="349857" y="667424"/>
+            <a:chExt cx="5868063" cy="4803072"/>
+          </a:xfrm>
+        </p:grpSpPr>
+        <p:grpSp>
+          <p:nvGrpSpPr>
+            <p:cNvPr id="67" name="Group 66"/>
+            <p:cNvGrpSpPr/>
+            <p:nvPr/>
+          </p:nvGrpSpPr>
+          <p:grpSpPr>
+            <a:xfrm>
+              <a:off x="349857" y="667424"/>
+              <a:ext cx="5868063" cy="4803072"/>
+              <a:chOff x="349857" y="667424"/>
+              <a:chExt cx="5868063" cy="4803072"/>
+            </a:xfrm>
+          </p:grpSpPr>
+          <p:sp>
+            <p:nvSpPr>
+              <p:cNvPr id="66" name="Rectangle 65"/>
+              <p:cNvSpPr/>
+              <p:nvPr/>
+            </p:nvSpPr>
+            <p:spPr>
+              <a:xfrm>
+                <a:off x="349857" y="1045251"/>
+                <a:ext cx="5868063" cy="4425245"/>
+              </a:xfrm>
+              <a:prstGeom prst="rect">
+                <a:avLst/>
+              </a:prstGeom>
+              <a:solidFill>
+                <a:schemeClr val="bg1"/>
+              </a:solidFill>
+              <a:ln>
+                <a:solidFill>
+                  <a:srgbClr val="0079D6"/>
+                </a:solidFill>
+                <a:prstDash val="sysDot"/>
+              </a:ln>
+            </p:spPr>
+            <p:style>
+              <a:lnRef idx="2">
+                <a:schemeClr val="accent1">
+                  <a:shade val="50000"/>
+                </a:schemeClr>
+              </a:lnRef>
+              <a:fillRef idx="1">
+                <a:schemeClr val="accent1"/>
+              </a:fillRef>
+              <a:effectRef idx="0">
+                <a:schemeClr val="accent1"/>
+              </a:effectRef>
+              <a:fontRef idx="minor">
+                <a:schemeClr val="lt1"/>
+              </a:fontRef>
+            </p:style>
+            <p:txBody>
+              <a:bodyPr rtlCol="0" anchor="ctr"/>
+              <a:lstStyle/>
+              <a:p>
+                <a:pPr algn="ctr"/>
+                <a:endParaRPr lang="en-US"/>
+              </a:p>
+            </p:txBody>
+          </p:sp>
+          <p:pic>
+            <p:nvPicPr>
+              <p:cNvPr id="4" name="Picture 3"/>
+              <p:cNvPicPr>
+                <a:picLocks noChangeAspect="1"/>
+              </p:cNvPicPr>
+              <p:nvPr/>
+            </p:nvPicPr>
+            <p:blipFill>
+              <a:blip r:embed="rId2">
+                <a:extLst>
+                  <a:ext uri="{28A0092B-C50C-407E-A947-70E740481C1C}">
+                    <a14:useLocalDpi xmlns:a14="http://schemas.microsoft.com/office/drawing/2010/main" val="0"/>
+                  </a:ext>
+                </a:extLst>
+              </a:blip>
+              <a:stretch>
+                <a:fillRect/>
+              </a:stretch>
+            </p:blipFill>
+            <p:spPr>
+              <a:xfrm>
+                <a:off x="454704" y="667424"/>
+                <a:ext cx="642996" cy="642996"/>
+              </a:xfrm>
+              <a:prstGeom prst="rect">
+                <a:avLst/>
+              </a:prstGeom>
+              <a:solidFill>
+                <a:schemeClr val="bg1"/>
+              </a:solidFill>
+            </p:spPr>
+          </p:pic>
+          <p:sp>
+            <p:nvSpPr>
+              <p:cNvPr id="15" name="TextBox 14"/>
+              <p:cNvSpPr txBox="1"/>
+              <p:nvPr/>
+            </p:nvSpPr>
+            <p:spPr>
+              <a:xfrm>
+                <a:off x="1147000" y="935884"/>
+                <a:ext cx="603251" cy="200055"/>
+              </a:xfrm>
+              <a:prstGeom prst="rect">
+                <a:avLst/>
+              </a:prstGeom>
+              <a:solidFill>
+                <a:schemeClr val="bg1"/>
+              </a:solidFill>
+            </p:spPr>
+            <p:txBody>
+              <a:bodyPr wrap="square" rtlCol="0">
+                <a:spAutoFit/>
+              </a:bodyPr>
+              <a:lstStyle/>
+              <a:p>
+                <a:r>
+                  <a:rPr lang="en-US" sz="700" dirty="0">
+                    <a:latin typeface="Segoe UI Light" panose="020B0502040204020203" pitchFamily="34" charset="0"/>
+                    <a:cs typeface="Segoe UI Light" panose="020B0502040204020203" pitchFamily="34" charset="0"/>
+                  </a:rPr>
+                  <a:t>oxford-ci</a:t>
+                </a:r>
+              </a:p>
+            </p:txBody>
+          </p:sp>
+          <p:grpSp>
+            <p:nvGrpSpPr>
+              <p:cNvPr id="65" name="Group 64"/>
+              <p:cNvGrpSpPr/>
+              <p:nvPr/>
+            </p:nvGrpSpPr>
+            <p:grpSpPr>
+              <a:xfrm>
+                <a:off x="659958" y="1255984"/>
+                <a:ext cx="5103232" cy="3955427"/>
+                <a:chOff x="874643" y="1494522"/>
+                <a:chExt cx="5103232" cy="3955427"/>
+              </a:xfrm>
+            </p:grpSpPr>
+            <p:cxnSp>
+              <p:nvCxnSpPr>
+                <p:cNvPr id="58" name="Straight Arrow Connector 57"/>
+                <p:cNvCxnSpPr>
+                  <a:cxnSpLocks/>
+                </p:cNvCxnSpPr>
+                <p:nvPr/>
+              </p:nvCxnSpPr>
+              <p:spPr>
+                <a:xfrm flipH="1">
+                  <a:off x="1577046" y="2751151"/>
+                  <a:ext cx="936532" cy="1523275"/>
+                </a:xfrm>
+                <a:prstGeom prst="straightConnector1">
+                  <a:avLst/>
+                </a:prstGeom>
+                <a:ln>
+                  <a:tailEnd type="triangle"/>
+                </a:ln>
+              </p:spPr>
+              <p:style>
+                <a:lnRef idx="1">
+                  <a:schemeClr val="accent1"/>
+                </a:lnRef>
+                <a:fillRef idx="0">
+                  <a:schemeClr val="accent1"/>
+                </a:fillRef>
+                <a:effectRef idx="0">
+                  <a:schemeClr val="accent1"/>
+                </a:effectRef>
+                <a:fontRef idx="minor">
+                  <a:schemeClr val="tx1"/>
+                </a:fontRef>
+              </p:style>
+            </p:cxnSp>
+            <p:grpSp>
+              <p:nvGrpSpPr>
+                <p:cNvPr id="53" name="Group 52"/>
+                <p:cNvGrpSpPr/>
+                <p:nvPr/>
+              </p:nvGrpSpPr>
+              <p:grpSpPr>
+                <a:xfrm>
+                  <a:off x="874643" y="3729804"/>
+                  <a:ext cx="2284891" cy="1720145"/>
+                  <a:chOff x="4214191" y="896422"/>
+                  <a:chExt cx="2284891" cy="1720145"/>
+                </a:xfrm>
+              </p:grpSpPr>
+              <p:sp>
+                <p:nvSpPr>
+                  <p:cNvPr id="52" name="Rectangle 51"/>
+                  <p:cNvSpPr/>
+                  <p:nvPr/>
+                </p:nvSpPr>
+                <p:spPr>
+                  <a:xfrm>
+                    <a:off x="4214191" y="1086096"/>
+                    <a:ext cx="2284891" cy="1530471"/>
+                  </a:xfrm>
+                  <a:prstGeom prst="rect">
+                    <a:avLst/>
+                  </a:prstGeom>
+                  <a:noFill/>
+                  <a:ln>
+                    <a:solidFill>
+                      <a:srgbClr val="0079D6"/>
+                    </a:solidFill>
+                    <a:prstDash val="sysDot"/>
+                  </a:ln>
+                </p:spPr>
+                <p:style>
+                  <a:lnRef idx="2">
+                    <a:schemeClr val="accent1">
+                      <a:shade val="50000"/>
+                    </a:schemeClr>
+                  </a:lnRef>
+                  <a:fillRef idx="1">
+                    <a:schemeClr val="accent1"/>
+                  </a:fillRef>
+                  <a:effectRef idx="0">
+                    <a:schemeClr val="accent1"/>
+                  </a:effectRef>
+                  <a:fontRef idx="minor">
+                    <a:schemeClr val="lt1"/>
+                  </a:fontRef>
+                </p:style>
+                <p:txBody>
+                  <a:bodyPr rtlCol="0" anchor="ctr"/>
+                  <a:lstStyle/>
+                  <a:p>
+                    <a:pPr algn="ctr"/>
+                    <a:endParaRPr lang="en-US"/>
+                  </a:p>
+                </p:txBody>
+              </p:sp>
+              <p:grpSp>
+                <p:nvGrpSpPr>
+                  <p:cNvPr id="6" name="Group 5"/>
+                  <p:cNvGrpSpPr/>
+                  <p:nvPr/>
+                </p:nvGrpSpPr>
+                <p:grpSpPr>
+                  <a:xfrm>
+                    <a:off x="4344118" y="896422"/>
+                    <a:ext cx="1237698" cy="503008"/>
+                    <a:chOff x="4450079" y="896422"/>
+                    <a:chExt cx="1237698" cy="503008"/>
+                  </a:xfrm>
+                </p:grpSpPr>
+                <p:pic>
+                  <p:nvPicPr>
+                    <p:cNvPr id="8" name="Picture 7"/>
+                    <p:cNvPicPr>
+                      <a:picLocks noChangeAspect="1"/>
+                    </p:cNvPicPr>
+                    <p:nvPr/>
+                  </p:nvPicPr>
+                  <p:blipFill>
+                    <a:blip r:embed="rId3">
+                      <a:extLst>
+                        <a:ext uri="{28A0092B-C50C-407E-A947-70E740481C1C}">
+                          <a14:useLocalDpi xmlns:a14="http://schemas.microsoft.com/office/drawing/2010/main" val="0"/>
+                        </a:ext>
+                      </a:extLst>
+                    </a:blip>
+                    <a:stretch>
+                      <a:fillRect/>
+                    </a:stretch>
+                  </p:blipFill>
+                  <p:spPr>
+                    <a:xfrm>
+                      <a:off x="4450079" y="896422"/>
+                      <a:ext cx="503008" cy="503008"/>
+                    </a:xfrm>
+                    <a:prstGeom prst="rect">
+                      <a:avLst/>
+                    </a:prstGeom>
+                    <a:solidFill>
+                      <a:schemeClr val="bg1"/>
+                    </a:solidFill>
+                  </p:spPr>
+                </p:pic>
+                <p:sp>
+                  <p:nvSpPr>
+                    <p:cNvPr id="13" name="TextBox 12"/>
+                    <p:cNvSpPr txBox="1"/>
+                    <p:nvPr/>
+                  </p:nvSpPr>
+                  <p:spPr>
+                    <a:xfrm>
+                      <a:off x="4953086" y="986070"/>
+                      <a:ext cx="734691" cy="200055"/>
+                    </a:xfrm>
+                    <a:prstGeom prst="rect">
+                      <a:avLst/>
+                    </a:prstGeom>
+                    <a:solidFill>
+                      <a:schemeClr val="bg1"/>
+                    </a:solidFill>
+                  </p:spPr>
+                  <p:txBody>
+                    <a:bodyPr wrap="square" rtlCol="0">
+                      <a:spAutoFit/>
+                    </a:bodyPr>
+                    <a:lstStyle/>
+                    <a:p>
+                      <a:r>
+                        <a:rPr lang="en-US" sz="700" dirty="0">
+                          <a:latin typeface="Segoe UI Light" panose="020B0502040204020203" pitchFamily="34" charset="0"/>
+                          <a:cs typeface="Segoe UI Light" panose="020B0502040204020203" pitchFamily="34" charset="0"/>
+                        </a:rPr>
+                        <a:t>oxfordcidisks01</a:t>
+                      </a:r>
+                    </a:p>
+                  </p:txBody>
+                </p:sp>
+              </p:grpSp>
+              <p:grpSp>
+                <p:nvGrpSpPr>
+                  <p:cNvPr id="2" name="Group 1"/>
+                  <p:cNvGrpSpPr/>
+                  <p:nvPr/>
+                </p:nvGrpSpPr>
+                <p:grpSpPr>
+                  <a:xfrm>
+                    <a:off x="4517709" y="1477683"/>
+                    <a:ext cx="780290" cy="1053624"/>
+                    <a:chOff x="4554876" y="1976781"/>
+                    <a:chExt cx="780290" cy="1053624"/>
+                  </a:xfrm>
+                </p:grpSpPr>
+                <p:pic>
+                  <p:nvPicPr>
+                    <p:cNvPr id="7" name="Picture 6"/>
+                    <p:cNvPicPr>
+                      <a:picLocks noChangeAspect="1"/>
+                    </p:cNvPicPr>
+                    <p:nvPr/>
+                  </p:nvPicPr>
+                  <p:blipFill>
+                    <a:blip r:embed="rId4">
+                      <a:extLst>
+                        <a:ext uri="{28A0092B-C50C-407E-A947-70E740481C1C}">
+                          <a14:useLocalDpi xmlns:a14="http://schemas.microsoft.com/office/drawing/2010/main" val="0"/>
+                        </a:ext>
+                      </a:extLst>
+                    </a:blip>
+                    <a:stretch>
+                      <a:fillRect/>
+                    </a:stretch>
+                  </p:blipFill>
+                  <p:spPr>
+                    <a:xfrm>
+                      <a:off x="4554876" y="1976781"/>
+                      <a:ext cx="780290" cy="780290"/>
+                    </a:xfrm>
+                    <a:prstGeom prst="rect">
+                      <a:avLst/>
+                    </a:prstGeom>
+                  </p:spPr>
+                </p:pic>
+                <p:sp>
+                  <p:nvSpPr>
+                    <p:cNvPr id="17" name="TextBox 16"/>
+                    <p:cNvSpPr txBox="1"/>
+                    <p:nvPr/>
+                  </p:nvSpPr>
+                  <p:spPr>
+                    <a:xfrm>
+                      <a:off x="4554876" y="2830350"/>
+                      <a:ext cx="780290" cy="200055"/>
+                    </a:xfrm>
+                    <a:prstGeom prst="rect">
+                      <a:avLst/>
+                    </a:prstGeom>
+                    <a:noFill/>
+                  </p:spPr>
+                  <p:txBody>
+                    <a:bodyPr wrap="square" rtlCol="0">
+                      <a:spAutoFit/>
+                    </a:bodyPr>
+                    <a:lstStyle/>
+                    <a:p>
+                      <a:r>
+                        <a:rPr lang="en-US" sz="700" dirty="0">
+                          <a:latin typeface="Segoe UI Light" panose="020B0502040204020203" pitchFamily="34" charset="0"/>
+                          <a:cs typeface="Segoe UI Light" panose="020B0502040204020203" pitchFamily="34" charset="0"/>
+                        </a:rPr>
+                        <a:t>OS Disk</a:t>
+                      </a:r>
+                    </a:p>
+                  </p:txBody>
+                </p:sp>
+              </p:grpSp>
+              <p:grpSp>
+                <p:nvGrpSpPr>
+                  <p:cNvPr id="3" name="Group 2"/>
+                  <p:cNvGrpSpPr/>
+                  <p:nvPr/>
+                </p:nvGrpSpPr>
+                <p:grpSpPr>
+                  <a:xfrm>
+                    <a:off x="5545687" y="1481751"/>
+                    <a:ext cx="780290" cy="1016984"/>
+                    <a:chOff x="5335166" y="2013421"/>
+                    <a:chExt cx="780290" cy="1016984"/>
+                  </a:xfrm>
+                </p:grpSpPr>
+                <p:pic>
+                  <p:nvPicPr>
+                    <p:cNvPr id="5" name="Picture 4"/>
+                    <p:cNvPicPr>
+                      <a:picLocks noChangeAspect="1"/>
+                    </p:cNvPicPr>
+                    <p:nvPr/>
+                  </p:nvPicPr>
+                  <p:blipFill>
+                    <a:blip r:embed="rId5">
+                      <a:extLst>
+                        <a:ext uri="{28A0092B-C50C-407E-A947-70E740481C1C}">
+                          <a14:useLocalDpi xmlns:a14="http://schemas.microsoft.com/office/drawing/2010/main" val="0"/>
+                        </a:ext>
+                      </a:extLst>
+                    </a:blip>
+                    <a:stretch>
+                      <a:fillRect/>
+                    </a:stretch>
+                  </p:blipFill>
+                  <p:spPr>
+                    <a:xfrm>
+                      <a:off x="5335166" y="2013421"/>
+                      <a:ext cx="780290" cy="780290"/>
+                    </a:xfrm>
+                    <a:prstGeom prst="rect">
+                      <a:avLst/>
+                    </a:prstGeom>
+                  </p:spPr>
+                </p:pic>
+                <p:sp>
+                  <p:nvSpPr>
+                    <p:cNvPr id="18" name="TextBox 17"/>
+                    <p:cNvSpPr txBox="1"/>
+                    <p:nvPr/>
+                  </p:nvSpPr>
+                  <p:spPr>
+                    <a:xfrm>
+                      <a:off x="5335166" y="2830350"/>
+                      <a:ext cx="780290" cy="200055"/>
+                    </a:xfrm>
+                    <a:prstGeom prst="rect">
+                      <a:avLst/>
+                    </a:prstGeom>
+                    <a:noFill/>
+                  </p:spPr>
+                  <p:txBody>
+                    <a:bodyPr wrap="square" rtlCol="0">
+                      <a:spAutoFit/>
+                    </a:bodyPr>
+                    <a:lstStyle/>
+                    <a:p>
+                      <a:pPr algn="ctr"/>
+                      <a:r>
+                        <a:rPr lang="en-US" sz="700" dirty="0">
+                          <a:latin typeface="Segoe UI Light" panose="020B0502040204020203" pitchFamily="34" charset="0"/>
+                          <a:cs typeface="Segoe UI Light" panose="020B0502040204020203" pitchFamily="34" charset="0"/>
+                        </a:rPr>
+                        <a:t>Data Disk</a:t>
+                      </a:r>
+                    </a:p>
+                  </p:txBody>
+                </p:sp>
+              </p:grpSp>
+            </p:grpSp>
+            <p:grpSp>
+              <p:nvGrpSpPr>
+                <p:cNvPr id="51" name="Group 50"/>
+                <p:cNvGrpSpPr/>
+                <p:nvPr/>
+              </p:nvGrpSpPr>
+              <p:grpSpPr>
+                <a:xfrm>
+                  <a:off x="3624289" y="3675890"/>
+                  <a:ext cx="2353586" cy="1774059"/>
+                  <a:chOff x="6838122" y="896422"/>
+                  <a:chExt cx="2353586" cy="1774059"/>
+                </a:xfrm>
+              </p:grpSpPr>
+              <p:sp>
+                <p:nvSpPr>
+                  <p:cNvPr id="50" name="Rectangle 49"/>
+                  <p:cNvSpPr/>
+                  <p:nvPr/>
+                </p:nvSpPr>
+                <p:spPr>
+                  <a:xfrm>
+                    <a:off x="6838122" y="1086096"/>
+                    <a:ext cx="2353586" cy="1584385"/>
+                  </a:xfrm>
+                  <a:prstGeom prst="rect">
+                    <a:avLst/>
+                  </a:prstGeom>
+                  <a:solidFill>
+                    <a:schemeClr val="bg1"/>
+                  </a:solidFill>
+                  <a:ln>
+                    <a:solidFill>
+                      <a:srgbClr val="0079D6"/>
+                    </a:solidFill>
+                    <a:prstDash val="sysDot"/>
+                  </a:ln>
+                </p:spPr>
+                <p:style>
+                  <a:lnRef idx="2">
+                    <a:schemeClr val="accent1">
+                      <a:shade val="50000"/>
+                    </a:schemeClr>
+                  </a:lnRef>
+                  <a:fillRef idx="1">
+                    <a:schemeClr val="accent1"/>
+                  </a:fillRef>
+                  <a:effectRef idx="0">
+                    <a:schemeClr val="accent1"/>
+                  </a:effectRef>
+                  <a:fontRef idx="minor">
+                    <a:schemeClr val="lt1"/>
+                  </a:fontRef>
+                </p:style>
+                <p:txBody>
+                  <a:bodyPr rtlCol="0" anchor="ctr"/>
+                  <a:lstStyle/>
+                  <a:p>
+                    <a:pPr algn="ctr"/>
+                    <a:endParaRPr lang="en-US"/>
+                  </a:p>
+                </p:txBody>
+              </p:sp>
+              <p:grpSp>
+                <p:nvGrpSpPr>
+                  <p:cNvPr id="48" name="Group 47"/>
+                  <p:cNvGrpSpPr/>
+                  <p:nvPr/>
+                </p:nvGrpSpPr>
+                <p:grpSpPr>
+                  <a:xfrm>
+                    <a:off x="6968535" y="896422"/>
+                    <a:ext cx="2154478" cy="1633860"/>
+                    <a:chOff x="6968535" y="896422"/>
+                    <a:chExt cx="2154478" cy="1633860"/>
+                  </a:xfrm>
+                </p:grpSpPr>
+                <p:grpSp>
+                  <p:nvGrpSpPr>
+                    <p:cNvPr id="33" name="Group 32"/>
+                    <p:cNvGrpSpPr/>
+                    <p:nvPr/>
+                  </p:nvGrpSpPr>
+                  <p:grpSpPr>
+                    <a:xfrm>
+                      <a:off x="6968535" y="896422"/>
+                      <a:ext cx="1185180" cy="503008"/>
+                      <a:chOff x="4450079" y="896422"/>
+                      <a:chExt cx="1185180" cy="503008"/>
+                    </a:xfrm>
+                  </p:grpSpPr>
+                  <p:pic>
+                    <p:nvPicPr>
+                      <p:cNvPr id="34" name="Picture 33"/>
+                      <p:cNvPicPr>
+                        <a:picLocks noChangeAspect="1"/>
+                      </p:cNvPicPr>
+                      <p:nvPr/>
+                    </p:nvPicPr>
+                    <p:blipFill>
+                      <a:blip r:embed="rId3">
+                        <a:extLst>
+                          <a:ext uri="{28A0092B-C50C-407E-A947-70E740481C1C}">
+                            <a14:useLocalDpi xmlns:a14="http://schemas.microsoft.com/office/drawing/2010/main" val="0"/>
+                          </a:ext>
+                        </a:extLst>
+                      </a:blip>
+                      <a:stretch>
+                        <a:fillRect/>
+                      </a:stretch>
+                    </p:blipFill>
+                    <p:spPr>
+                      <a:xfrm>
+                        <a:off x="4450079" y="896422"/>
+                        <a:ext cx="503008" cy="503008"/>
+                      </a:xfrm>
+                      <a:prstGeom prst="rect">
+                        <a:avLst/>
+                      </a:prstGeom>
+                      <a:solidFill>
+                        <a:schemeClr val="bg1"/>
+                      </a:solidFill>
+                    </p:spPr>
+                  </p:pic>
+                  <p:sp>
+                    <p:nvSpPr>
+                      <p:cNvPr id="35" name="TextBox 34"/>
+                      <p:cNvSpPr txBox="1"/>
+                      <p:nvPr/>
+                    </p:nvSpPr>
+                    <p:spPr>
+                      <a:xfrm>
+                        <a:off x="4937184" y="986070"/>
+                        <a:ext cx="698075" cy="200055"/>
+                      </a:xfrm>
+                      <a:prstGeom prst="rect">
+                        <a:avLst/>
+                      </a:prstGeom>
+                      <a:solidFill>
+                        <a:schemeClr val="bg1"/>
+                      </a:solidFill>
+                    </p:spPr>
+                    <p:txBody>
+                      <a:bodyPr wrap="square" rtlCol="0">
+                        <a:spAutoFit/>
+                      </a:bodyPr>
+                      <a:lstStyle/>
+                      <a:p>
+                        <a:r>
+                          <a:rPr lang="en-US" sz="700" dirty="0">
+                            <a:latin typeface="Segoe UI Light" panose="020B0502040204020203" pitchFamily="34" charset="0"/>
+                            <a:cs typeface="Segoe UI Light" panose="020B0502040204020203" pitchFamily="34" charset="0"/>
+                          </a:rPr>
+                          <a:t>oxfordcifiles01</a:t>
+                        </a:r>
+                      </a:p>
+                    </p:txBody>
+                  </p:sp>
+                </p:grpSp>
+                <p:grpSp>
+                  <p:nvGrpSpPr>
+                    <p:cNvPr id="40" name="Group 39"/>
+                    <p:cNvGrpSpPr/>
+                    <p:nvPr/>
+                  </p:nvGrpSpPr>
+                  <p:grpSpPr>
+                    <a:xfrm>
+                      <a:off x="7996513" y="1514659"/>
+                      <a:ext cx="1126500" cy="1009807"/>
+                      <a:chOff x="8582043" y="1520475"/>
+                      <a:chExt cx="1126500" cy="1009807"/>
+                    </a:xfrm>
+                  </p:grpSpPr>
+                  <p:pic>
+                    <p:nvPicPr>
+                      <p:cNvPr id="38" name="Picture 37"/>
+                      <p:cNvPicPr>
+                        <a:picLocks noChangeAspect="1"/>
+                      </p:cNvPicPr>
+                      <p:nvPr/>
+                    </p:nvPicPr>
+                    <p:blipFill>
+                      <a:blip r:embed="rId6">
+                        <a:extLst>
+                          <a:ext uri="{28A0092B-C50C-407E-A947-70E740481C1C}">
+                            <a14:useLocalDpi xmlns:a14="http://schemas.microsoft.com/office/drawing/2010/main" val="0"/>
+                          </a:ext>
+                        </a:extLst>
+                      </a:blip>
+                      <a:stretch>
+                        <a:fillRect/>
+                      </a:stretch>
+                    </p:blipFill>
+                    <p:spPr>
+                      <a:xfrm>
+                        <a:off x="8755148" y="1520475"/>
+                        <a:ext cx="780290" cy="780290"/>
+                      </a:xfrm>
+                      <a:prstGeom prst="rect">
+                        <a:avLst/>
+                      </a:prstGeom>
+                    </p:spPr>
+                  </p:pic>
+                  <p:sp>
+                    <p:nvSpPr>
+                      <p:cNvPr id="39" name="TextBox 38"/>
+                      <p:cNvSpPr txBox="1"/>
+                      <p:nvPr/>
+                    </p:nvSpPr>
+                    <p:spPr>
+                      <a:xfrm>
+                        <a:off x="8582043" y="2330227"/>
+                        <a:ext cx="1126500" cy="200055"/>
+                      </a:xfrm>
+                      <a:prstGeom prst="rect">
+                        <a:avLst/>
+                      </a:prstGeom>
+                      <a:noFill/>
+                    </p:spPr>
+                    <p:txBody>
+                      <a:bodyPr wrap="square" rtlCol="0">
+                        <a:spAutoFit/>
+                      </a:bodyPr>
+                      <a:lstStyle/>
+                      <a:p>
+                        <a:pPr algn="ctr"/>
+                        <a:r>
+                          <a:rPr lang="en-US" sz="700" dirty="0" err="1">
+                            <a:latin typeface="Segoe UI Light" panose="020B0502040204020203" pitchFamily="34" charset="0"/>
+                            <a:cs typeface="Segoe UI Light" panose="020B0502040204020203" pitchFamily="34" charset="0"/>
+                          </a:rPr>
+                          <a:t>oxfordci</a:t>
+                        </a:r>
+                        <a:r>
+                          <a:rPr lang="en-US" sz="700" dirty="0">
+                            <a:latin typeface="Segoe UI Light" panose="020B0502040204020203" pitchFamily="34" charset="0"/>
+                            <a:cs typeface="Segoe UI Light" panose="020B0502040204020203" pitchFamily="34" charset="0"/>
+                          </a:rPr>
+                          <a:t>-build-setup</a:t>
+                        </a:r>
+                      </a:p>
+                    </p:txBody>
+                  </p:sp>
+                </p:grpSp>
+                <p:grpSp>
+                  <p:nvGrpSpPr>
+                    <p:cNvPr id="41" name="Group 40"/>
+                    <p:cNvGrpSpPr/>
+                    <p:nvPr/>
+                  </p:nvGrpSpPr>
+                  <p:grpSpPr>
+                    <a:xfrm>
+                      <a:off x="6968535" y="1520475"/>
+                      <a:ext cx="1126500" cy="1009807"/>
+                      <a:chOff x="8582043" y="1520475"/>
+                      <a:chExt cx="1126500" cy="1009807"/>
+                    </a:xfrm>
+                  </p:grpSpPr>
+                  <p:pic>
+                    <p:nvPicPr>
+                      <p:cNvPr id="42" name="Picture 41"/>
+                      <p:cNvPicPr>
+                        <a:picLocks noChangeAspect="1"/>
+                      </p:cNvPicPr>
+                      <p:nvPr/>
+                    </p:nvPicPr>
+                    <p:blipFill>
+                      <a:blip r:embed="rId6">
+                        <a:extLst>
+                          <a:ext uri="{28A0092B-C50C-407E-A947-70E740481C1C}">
+                            <a14:useLocalDpi xmlns:a14="http://schemas.microsoft.com/office/drawing/2010/main" val="0"/>
+                          </a:ext>
+                        </a:extLst>
+                      </a:blip>
+                      <a:stretch>
+                        <a:fillRect/>
+                      </a:stretch>
+                    </p:blipFill>
+                    <p:spPr>
+                      <a:xfrm>
+                        <a:off x="8755148" y="1520475"/>
+                        <a:ext cx="780290" cy="780290"/>
+                      </a:xfrm>
+                      <a:prstGeom prst="rect">
+                        <a:avLst/>
+                      </a:prstGeom>
+                    </p:spPr>
+                  </p:pic>
+                  <p:sp>
+                    <p:nvSpPr>
+                      <p:cNvPr id="43" name="TextBox 42"/>
+                      <p:cNvSpPr txBox="1"/>
+                      <p:nvPr/>
+                    </p:nvSpPr>
+                    <p:spPr>
+                      <a:xfrm>
+                        <a:off x="8582043" y="2330227"/>
+                        <a:ext cx="1126500" cy="200055"/>
+                      </a:xfrm>
+                      <a:prstGeom prst="rect">
+                        <a:avLst/>
+                      </a:prstGeom>
+                      <a:noFill/>
+                    </p:spPr>
+                    <p:txBody>
+                      <a:bodyPr wrap="square" rtlCol="0">
+                        <a:spAutoFit/>
+                      </a:bodyPr>
+                      <a:lstStyle/>
+                      <a:p>
+                        <a:pPr algn="ctr"/>
+                        <a:r>
+                          <a:rPr lang="en-US" sz="700" dirty="0" err="1">
+                            <a:latin typeface="Segoe UI Light" panose="020B0502040204020203" pitchFamily="34" charset="0"/>
+                            <a:cs typeface="Segoe UI Light" panose="020B0502040204020203" pitchFamily="34" charset="0"/>
+                          </a:rPr>
+                          <a:t>oxfordci</a:t>
+                        </a:r>
+                        <a:r>
+                          <a:rPr lang="en-US" sz="700" dirty="0">
+                            <a:latin typeface="Segoe UI Light" panose="020B0502040204020203" pitchFamily="34" charset="0"/>
+                            <a:cs typeface="Segoe UI Light" panose="020B0502040204020203" pitchFamily="34" charset="0"/>
+                          </a:rPr>
+                          <a:t>-build</a:t>
+                        </a:r>
+                      </a:p>
+                    </p:txBody>
+                  </p:sp>
+                </p:grpSp>
+              </p:grpSp>
+            </p:grpSp>
+            <p:grpSp>
+              <p:nvGrpSpPr>
+                <p:cNvPr id="56" name="Group 55"/>
+                <p:cNvGrpSpPr/>
+                <p:nvPr/>
+              </p:nvGrpSpPr>
+              <p:grpSpPr>
+                <a:xfrm>
+                  <a:off x="1983673" y="1494522"/>
+                  <a:ext cx="2894274" cy="1374163"/>
+                  <a:chOff x="667910" y="1934888"/>
+                  <a:chExt cx="2894274" cy="1374163"/>
+                </a:xfrm>
+              </p:grpSpPr>
+              <p:sp>
+                <p:nvSpPr>
+                  <p:cNvPr id="55" name="Rectangle 54"/>
+                  <p:cNvSpPr/>
+                  <p:nvPr/>
+                </p:nvSpPr>
+                <p:spPr>
+                  <a:xfrm>
+                    <a:off x="667910" y="2213927"/>
+                    <a:ext cx="2894274" cy="1095124"/>
+                  </a:xfrm>
+                  <a:prstGeom prst="rect">
+                    <a:avLst/>
+                  </a:prstGeom>
+                  <a:noFill/>
+                  <a:ln>
+                    <a:solidFill>
+                      <a:srgbClr val="0079D6"/>
+                    </a:solidFill>
+                    <a:prstDash val="sysDot"/>
+                  </a:ln>
+                </p:spPr>
+                <p:style>
+                  <a:lnRef idx="2">
+                    <a:schemeClr val="accent1">
+                      <a:shade val="50000"/>
+                    </a:schemeClr>
+                  </a:lnRef>
+                  <a:fillRef idx="1">
+                    <a:schemeClr val="accent1"/>
+                  </a:fillRef>
+                  <a:effectRef idx="0">
+                    <a:schemeClr val="accent1"/>
+                  </a:effectRef>
+                  <a:fontRef idx="minor">
+                    <a:schemeClr val="lt1"/>
+                  </a:fontRef>
+                </p:style>
+                <p:txBody>
+                  <a:bodyPr rtlCol="0" anchor="ctr"/>
+                  <a:lstStyle/>
+                  <a:p>
+                    <a:pPr algn="ctr"/>
+                    <a:endParaRPr lang="en-US"/>
+                  </a:p>
+                </p:txBody>
+              </p:sp>
+              <p:pic>
+                <p:nvPicPr>
+                  <p:cNvPr id="24" name="Picture 23"/>
+                  <p:cNvPicPr>
+                    <a:picLocks noChangeAspect="1"/>
+                  </p:cNvPicPr>
+                  <p:nvPr/>
+                </p:nvPicPr>
+                <p:blipFill>
+                  <a:blip r:embed="rId4">
+                    <a:extLst>
+                      <a:ext uri="{28A0092B-C50C-407E-A947-70E740481C1C}">
+                        <a14:useLocalDpi xmlns:a14="http://schemas.microsoft.com/office/drawing/2010/main" val="0"/>
+                      </a:ext>
+                    </a:extLst>
+                  </a:blip>
+                  <a:stretch>
+                    <a:fillRect/>
+                  </a:stretch>
+                </p:blipFill>
+                <p:spPr>
+                  <a:xfrm>
+                    <a:off x="1003346" y="2676069"/>
+                    <a:ext cx="426959" cy="426959"/>
+                  </a:xfrm>
+                  <a:prstGeom prst="rect">
+                    <a:avLst/>
+                  </a:prstGeom>
+                </p:spPr>
+              </p:pic>
+              <p:pic>
+                <p:nvPicPr>
+                  <p:cNvPr id="27" name="Picture 26"/>
+                  <p:cNvPicPr>
+                    <a:picLocks noChangeAspect="1"/>
+                  </p:cNvPicPr>
+                  <p:nvPr/>
+                </p:nvPicPr>
+                <p:blipFill>
+                  <a:blip r:embed="rId5">
+                    <a:extLst>
+                      <a:ext uri="{28A0092B-C50C-407E-A947-70E740481C1C}">
+                        <a14:useLocalDpi xmlns:a14="http://schemas.microsoft.com/office/drawing/2010/main" val="0"/>
+                      </a:ext>
+                    </a:extLst>
+                  </a:blip>
+                  <a:stretch>
+                    <a:fillRect/>
+                  </a:stretch>
+                </p:blipFill>
+                <p:spPr>
+                  <a:xfrm>
+                    <a:off x="1478599" y="2676069"/>
+                    <a:ext cx="426959" cy="426959"/>
+                  </a:xfrm>
+                  <a:prstGeom prst="rect">
+                    <a:avLst/>
+                  </a:prstGeom>
+                </p:spPr>
+              </p:pic>
+              <p:grpSp>
+                <p:nvGrpSpPr>
+                  <p:cNvPr id="54" name="Group 53"/>
+                  <p:cNvGrpSpPr/>
+                  <p:nvPr/>
+                </p:nvGrpSpPr>
+                <p:grpSpPr>
+                  <a:xfrm>
+                    <a:off x="874643" y="1934888"/>
+                    <a:ext cx="2266120" cy="646344"/>
+                    <a:chOff x="1278271" y="1970223"/>
+                    <a:chExt cx="2266120" cy="646344"/>
+                  </a:xfrm>
+                </p:grpSpPr>
+                <p:pic>
+                  <p:nvPicPr>
+                    <p:cNvPr id="11" name="Picture 10"/>
+                    <p:cNvPicPr>
+                      <a:picLocks noChangeAspect="1"/>
+                    </p:cNvPicPr>
+                    <p:nvPr/>
+                  </p:nvPicPr>
+                  <p:blipFill>
+                    <a:blip r:embed="rId7">
+                      <a:extLst>
+                        <a:ext uri="{28A0092B-C50C-407E-A947-70E740481C1C}">
+                          <a14:useLocalDpi xmlns:a14="http://schemas.microsoft.com/office/drawing/2010/main" val="0"/>
+                        </a:ext>
+                      </a:extLst>
+                    </a:blip>
+                    <a:stretch>
+                      <a:fillRect/>
+                    </a:stretch>
+                  </p:blipFill>
+                  <p:spPr>
+                    <a:xfrm>
+                      <a:off x="1278271" y="1970223"/>
+                      <a:ext cx="646344" cy="646344"/>
+                    </a:xfrm>
+                    <a:prstGeom prst="rect">
+                      <a:avLst/>
+                    </a:prstGeom>
+                    <a:solidFill>
+                      <a:schemeClr val="bg1"/>
+                    </a:solidFill>
+                  </p:spPr>
+                </p:pic>
+                <p:sp>
+                  <p:nvSpPr>
+                    <p:cNvPr id="44" name="TextBox 43"/>
+                    <p:cNvSpPr txBox="1"/>
+                    <p:nvPr/>
+                  </p:nvSpPr>
+                  <p:spPr>
+                    <a:xfrm>
+                      <a:off x="1952328" y="2149236"/>
+                      <a:ext cx="1592063" cy="200055"/>
+                    </a:xfrm>
+                    <a:prstGeom prst="rect">
+                      <a:avLst/>
+                    </a:prstGeom>
+                    <a:solidFill>
+                      <a:schemeClr val="bg1"/>
+                    </a:solidFill>
+                  </p:spPr>
+                  <p:txBody>
+                    <a:bodyPr wrap="square" rtlCol="0">
+                      <a:spAutoFit/>
+                    </a:bodyPr>
+                    <a:lstStyle/>
+                    <a:p>
+                      <a:r>
+                        <a:rPr lang="en-US" sz="700" dirty="0">
+                          <a:latin typeface="Segoe UI Light" panose="020B0502040204020203" pitchFamily="34" charset="0"/>
+                          <a:cs typeface="Segoe UI Light" panose="020B0502040204020203" pitchFamily="34" charset="0"/>
+                        </a:rPr>
+                        <a:t>oxfordci.westus.cloudapp.azure.com</a:t>
+                      </a:r>
+                    </a:p>
+                  </p:txBody>
+                </p:sp>
+              </p:grpSp>
+              <p:pic>
+                <p:nvPicPr>
+                  <p:cNvPr id="45" name="Picture 44"/>
+                  <p:cNvPicPr>
+                    <a:picLocks noChangeAspect="1"/>
+                  </p:cNvPicPr>
+                  <p:nvPr/>
+                </p:nvPicPr>
+                <p:blipFill>
+                  <a:blip r:embed="rId6">
+                    <a:extLst>
+                      <a:ext uri="{28A0092B-C50C-407E-A947-70E740481C1C}">
+                        <a14:useLocalDpi xmlns:a14="http://schemas.microsoft.com/office/drawing/2010/main" val="0"/>
+                      </a:ext>
+                    </a:extLst>
+                  </a:blip>
+                  <a:stretch>
+                    <a:fillRect/>
+                  </a:stretch>
+                </p:blipFill>
+                <p:spPr>
+                  <a:xfrm>
+                    <a:off x="1953852" y="2676069"/>
+                    <a:ext cx="426959" cy="426959"/>
+                  </a:xfrm>
+                  <a:prstGeom prst="rect">
+                    <a:avLst/>
+                  </a:prstGeom>
+                </p:spPr>
+              </p:pic>
+              <p:pic>
+                <p:nvPicPr>
+                  <p:cNvPr id="46" name="Picture 45"/>
+                  <p:cNvPicPr>
+                    <a:picLocks noChangeAspect="1"/>
+                  </p:cNvPicPr>
+                  <p:nvPr/>
+                </p:nvPicPr>
+                <p:blipFill>
+                  <a:blip r:embed="rId6">
+                    <a:extLst>
+                      <a:ext uri="{28A0092B-C50C-407E-A947-70E740481C1C}">
+                        <a14:useLocalDpi xmlns:a14="http://schemas.microsoft.com/office/drawing/2010/main" val="0"/>
+                      </a:ext>
+                    </a:extLst>
+                  </a:blip>
+                  <a:stretch>
+                    <a:fillRect/>
+                  </a:stretch>
+                </p:blipFill>
+                <p:spPr>
+                  <a:xfrm>
+                    <a:off x="2429105" y="2676069"/>
+                    <a:ext cx="426959" cy="426959"/>
+                  </a:xfrm>
+                  <a:prstGeom prst="rect">
+                    <a:avLst/>
+                  </a:prstGeom>
+                </p:spPr>
+              </p:pic>
+            </p:grpSp>
+            <p:cxnSp>
+              <p:nvCxnSpPr>
+                <p:cNvPr id="60" name="Straight Arrow Connector 59"/>
+                <p:cNvCxnSpPr/>
+                <p:nvPr/>
+              </p:nvCxnSpPr>
+              <p:spPr>
+                <a:xfrm flipH="1">
+                  <a:off x="2668732" y="2683313"/>
+                  <a:ext cx="289562" cy="1509920"/>
+                </a:xfrm>
+                <a:prstGeom prst="straightConnector1">
+                  <a:avLst/>
+                </a:prstGeom>
+                <a:ln>
+                  <a:tailEnd type="triangle"/>
+                </a:ln>
+              </p:spPr>
+              <p:style>
+                <a:lnRef idx="1">
+                  <a:schemeClr val="accent1"/>
+                </a:lnRef>
+                <a:fillRef idx="0">
+                  <a:schemeClr val="accent1"/>
+                </a:fillRef>
+                <a:effectRef idx="0">
+                  <a:schemeClr val="accent1"/>
+                </a:effectRef>
+                <a:fontRef idx="minor">
+                  <a:schemeClr val="tx1"/>
+                </a:fontRef>
+              </p:style>
+            </p:cxnSp>
+            <p:cxnSp>
+              <p:nvCxnSpPr>
+                <p:cNvPr id="62" name="Straight Arrow Connector 61"/>
+                <p:cNvCxnSpPr/>
+                <p:nvPr/>
+              </p:nvCxnSpPr>
+              <p:spPr>
+                <a:xfrm>
+                  <a:off x="3496865" y="2662662"/>
+                  <a:ext cx="903793" cy="1516236"/>
+                </a:xfrm>
+                <a:prstGeom prst="straightConnector1">
+                  <a:avLst/>
+                </a:prstGeom>
+                <a:ln>
+                  <a:tailEnd type="triangle"/>
+                </a:ln>
+              </p:spPr>
+              <p:style>
+                <a:lnRef idx="1">
+                  <a:schemeClr val="accent1"/>
+                </a:lnRef>
+                <a:fillRef idx="0">
+                  <a:schemeClr val="accent1"/>
+                </a:fillRef>
+                <a:effectRef idx="0">
+                  <a:schemeClr val="accent1"/>
+                </a:effectRef>
+                <a:fontRef idx="minor">
+                  <a:schemeClr val="tx1"/>
+                </a:fontRef>
+              </p:style>
+            </p:cxnSp>
+            <p:cxnSp>
+              <p:nvCxnSpPr>
+                <p:cNvPr id="64" name="Straight Arrow Connector 63"/>
+                <p:cNvCxnSpPr/>
+                <p:nvPr/>
+              </p:nvCxnSpPr>
+              <p:spPr>
+                <a:xfrm>
+                  <a:off x="4161329" y="2609007"/>
+                  <a:ext cx="1052054" cy="1647733"/>
+                </a:xfrm>
+                <a:prstGeom prst="straightConnector1">
+                  <a:avLst/>
+                </a:prstGeom>
+                <a:ln>
+                  <a:tailEnd type="triangle"/>
+                </a:ln>
+              </p:spPr>
+              <p:style>
+                <a:lnRef idx="1">
+                  <a:schemeClr val="accent1"/>
+                </a:lnRef>
+                <a:fillRef idx="0">
+                  <a:schemeClr val="accent1"/>
+                </a:fillRef>
+                <a:effectRef idx="0">
+                  <a:schemeClr val="accent1"/>
+                </a:effectRef>
+                <a:fontRef idx="minor">
+                  <a:schemeClr val="tx1"/>
+                </a:fontRef>
+              </p:style>
+            </p:cxnSp>
+          </p:grpSp>
+        </p:grpSp>
+        <p:pic>
+          <p:nvPicPr>
+            <p:cNvPr id="9" name="Picture 8"/>
+            <p:cNvPicPr>
+              <a:picLocks noChangeAspect="1"/>
+            </p:cNvPicPr>
+            <p:nvPr/>
+          </p:nvPicPr>
+          <p:blipFill>
+            <a:blip r:embed="rId8">
+              <a:extLst>
+                <a:ext uri="{28A0092B-C50C-407E-A947-70E740481C1C}">
+                  <a14:useLocalDpi xmlns:a14="http://schemas.microsoft.com/office/drawing/2010/main" val="0"/>
+                </a:ext>
+              </a:extLst>
+            </a:blip>
+            <a:stretch>
+              <a:fillRect/>
+            </a:stretch>
+          </p:blipFill>
+          <p:spPr>
+            <a:xfrm>
+              <a:off x="2723133" y="1022970"/>
+              <a:ext cx="390153" cy="390153"/>
+            </a:xfrm>
+            <a:prstGeom prst="rect">
+              <a:avLst/>
+            </a:prstGeom>
+          </p:spPr>
+        </p:pic>
+        <p:pic>
+          <p:nvPicPr>
+            <p:cNvPr id="10" name="Picture 9"/>
+            <p:cNvPicPr>
+              <a:picLocks noChangeAspect="1"/>
+            </p:cNvPicPr>
+            <p:nvPr/>
+          </p:nvPicPr>
+          <p:blipFill>
+            <a:blip r:embed="rId9">
+              <a:extLst>
+                <a:ext uri="{28A0092B-C50C-407E-A947-70E740481C1C}">
+                  <a14:useLocalDpi xmlns:a14="http://schemas.microsoft.com/office/drawing/2010/main" val="0"/>
+                </a:ext>
+              </a:extLst>
+            </a:blip>
+            <a:stretch>
+              <a:fillRect/>
+            </a:stretch>
+          </p:blipFill>
+          <p:spPr>
+            <a:xfrm>
+              <a:off x="2095909" y="2878872"/>
+              <a:ext cx="390153" cy="390153"/>
+            </a:xfrm>
+            <a:prstGeom prst="rect">
+              <a:avLst/>
+            </a:prstGeom>
+          </p:spPr>
+        </p:pic>
+        <p:pic>
+          <p:nvPicPr>
+            <p:cNvPr id="12" name="Picture 11"/>
+            <p:cNvPicPr>
+              <a:picLocks noChangeAspect="1"/>
+            </p:cNvPicPr>
+            <p:nvPr/>
+          </p:nvPicPr>
+          <p:blipFill>
+            <a:blip r:embed="rId10">
+              <a:extLst>
+                <a:ext uri="{28A0092B-C50C-407E-A947-70E740481C1C}">
+                  <a14:useLocalDpi xmlns:a14="http://schemas.microsoft.com/office/drawing/2010/main" val="0"/>
+                </a:ext>
+              </a:extLst>
+            </a:blip>
+            <a:stretch>
+              <a:fillRect/>
+            </a:stretch>
+          </p:blipFill>
+          <p:spPr>
+            <a:xfrm>
+              <a:off x="3865934" y="2830521"/>
+              <a:ext cx="390153" cy="390153"/>
+            </a:xfrm>
+            <a:prstGeom prst="rect">
+              <a:avLst/>
+            </a:prstGeom>
+          </p:spPr>
+        </p:pic>
+      </p:grpSp>
+    </p:spTree>
+    <p:extLst>
+      <p:ext uri="{BB962C8B-B14F-4D97-AF65-F5344CB8AC3E}">
+        <p14:creationId xmlns:p14="http://schemas.microsoft.com/office/powerpoint/2010/main" val="738262078"/>
+      </p:ext>
+    </p:extLst>
+  </p:cSld>
+  <p:clrMapOvr>
+    <a:masterClrMapping/>
+  </p:clrMapOvr>
+</p:sld>
+</file>
+
 <file path=ppt/theme/theme1.xml><?xml version="1.0" encoding="utf-8"?>
 <a:theme xmlns:a="http://schemas.openxmlformats.org/drawingml/2006/main" name="Office Theme">
   <a:themeElements>

</xml_diff>